<commit_message>
final notes for lesson15
</commit_message>
<xml_diff>
--- a/lesson15/Final Thoughts.pptx
+++ b/lesson15/Final Thoughts.pptx
@@ -8,8 +8,6 @@
     <p:sldId id="256" r:id="rId2"/>
     <p:sldId id="257" r:id="rId3"/>
     <p:sldId id="258" r:id="rId4"/>
-    <p:sldId id="259" r:id="rId5"/>
-    <p:sldId id="260" r:id="rId6"/>
   </p:sldIdLst>
   <p:sldSz cx="12192000" cy="6858000"/>
   <p:notesSz cx="6858000" cy="9144000"/>
@@ -108,6 +106,11 @@
       </a:defRPr>
     </a:lvl9pPr>
   </p:defaultTextStyle>
+  <p:extLst>
+    <p:ext uri="{EFAFB233-063F-42B5-8137-9DF3F51BA10A}">
+      <p15:sldGuideLst xmlns:p15="http://schemas.microsoft.com/office/powerpoint/2012/main"/>
+    </p:ext>
+  </p:extLst>
 </p:presentation>
 </file>
 
@@ -258,7 +261,7 @@
           <a:p>
             <a:fld id="{DE9D0AD4-C450-4649-988C-ABAF4FB6A9AA}" type="datetimeFigureOut">
               <a:rPr lang="en-US" smtClean="0"/>
-              <a:t>8/14/2025</a:t>
+              <a:t>8/20/2025</a:t>
             </a:fld>
             <a:endParaRPr lang="en-US"/>
           </a:p>
@@ -456,7 +459,7 @@
           <a:p>
             <a:fld id="{DE9D0AD4-C450-4649-988C-ABAF4FB6A9AA}" type="datetimeFigureOut">
               <a:rPr lang="en-US" smtClean="0"/>
-              <a:t>8/14/2025</a:t>
+              <a:t>8/20/2025</a:t>
             </a:fld>
             <a:endParaRPr lang="en-US"/>
           </a:p>
@@ -664,7 +667,7 @@
           <a:p>
             <a:fld id="{DE9D0AD4-C450-4649-988C-ABAF4FB6A9AA}" type="datetimeFigureOut">
               <a:rPr lang="en-US" smtClean="0"/>
-              <a:t>8/14/2025</a:t>
+              <a:t>8/20/2025</a:t>
             </a:fld>
             <a:endParaRPr lang="en-US"/>
           </a:p>
@@ -862,7 +865,7 @@
           <a:p>
             <a:fld id="{DE9D0AD4-C450-4649-988C-ABAF4FB6A9AA}" type="datetimeFigureOut">
               <a:rPr lang="en-US" smtClean="0"/>
-              <a:t>8/14/2025</a:t>
+              <a:t>8/20/2025</a:t>
             </a:fld>
             <a:endParaRPr lang="en-US"/>
           </a:p>
@@ -1137,7 +1140,7 @@
           <a:p>
             <a:fld id="{DE9D0AD4-C450-4649-988C-ABAF4FB6A9AA}" type="datetimeFigureOut">
               <a:rPr lang="en-US" smtClean="0"/>
-              <a:t>8/14/2025</a:t>
+              <a:t>8/20/2025</a:t>
             </a:fld>
             <a:endParaRPr lang="en-US"/>
           </a:p>
@@ -1402,7 +1405,7 @@
           <a:p>
             <a:fld id="{DE9D0AD4-C450-4649-988C-ABAF4FB6A9AA}" type="datetimeFigureOut">
               <a:rPr lang="en-US" smtClean="0"/>
-              <a:t>8/14/2025</a:t>
+              <a:t>8/20/2025</a:t>
             </a:fld>
             <a:endParaRPr lang="en-US"/>
           </a:p>
@@ -1814,7 +1817,7 @@
           <a:p>
             <a:fld id="{DE9D0AD4-C450-4649-988C-ABAF4FB6A9AA}" type="datetimeFigureOut">
               <a:rPr lang="en-US" smtClean="0"/>
-              <a:t>8/14/2025</a:t>
+              <a:t>8/20/2025</a:t>
             </a:fld>
             <a:endParaRPr lang="en-US"/>
           </a:p>
@@ -1955,7 +1958,7 @@
           <a:p>
             <a:fld id="{DE9D0AD4-C450-4649-988C-ABAF4FB6A9AA}" type="datetimeFigureOut">
               <a:rPr lang="en-US" smtClean="0"/>
-              <a:t>8/14/2025</a:t>
+              <a:t>8/20/2025</a:t>
             </a:fld>
             <a:endParaRPr lang="en-US"/>
           </a:p>
@@ -2068,7 +2071,7 @@
           <a:p>
             <a:fld id="{DE9D0AD4-C450-4649-988C-ABAF4FB6A9AA}" type="datetimeFigureOut">
               <a:rPr lang="en-US" smtClean="0"/>
-              <a:t>8/14/2025</a:t>
+              <a:t>8/20/2025</a:t>
             </a:fld>
             <a:endParaRPr lang="en-US"/>
           </a:p>
@@ -2379,7 +2382,7 @@
           <a:p>
             <a:fld id="{DE9D0AD4-C450-4649-988C-ABAF4FB6A9AA}" type="datetimeFigureOut">
               <a:rPr lang="en-US" smtClean="0"/>
-              <a:t>8/14/2025</a:t>
+              <a:t>8/20/2025</a:t>
             </a:fld>
             <a:endParaRPr lang="en-US"/>
           </a:p>
@@ -2667,7 +2670,7 @@
           <a:p>
             <a:fld id="{DE9D0AD4-C450-4649-988C-ABAF4FB6A9AA}" type="datetimeFigureOut">
               <a:rPr lang="en-US" smtClean="0"/>
-              <a:t>8/14/2025</a:t>
+              <a:t>8/20/2025</a:t>
             </a:fld>
             <a:endParaRPr lang="en-US"/>
           </a:p>
@@ -2908,7 +2911,7 @@
           <a:p>
             <a:fld id="{DE9D0AD4-C450-4649-988C-ABAF4FB6A9AA}" type="datetimeFigureOut">
               <a:rPr lang="en-US" smtClean="0"/>
-              <a:t>8/14/2025</a:t>
+              <a:t>8/20/2025</a:t>
             </a:fld>
             <a:endParaRPr lang="en-US"/>
           </a:p>
@@ -3565,7 +3568,7 @@
           <p:cNvPr id="2" name="Title 1">
             <a:extLst>
               <a:ext uri="{FF2B5EF4-FFF2-40B4-BE49-F238E27FC236}">
-                <a16:creationId xmlns:a16="http://schemas.microsoft.com/office/drawing/2014/main" id="{74CB98EE-C38E-BA21-4299-9F39E0C798A2}"/>
+                <a16:creationId xmlns:a16="http://schemas.microsoft.com/office/drawing/2014/main" id="{25246AB4-25B4-CAB0-D5B5-AE8D0A8C18CB}"/>
               </a:ext>
             </a:extLst>
           </p:cNvPr>
@@ -3583,45 +3586,42 @@
           <a:p>
             <a:r>
               <a:rPr lang="en-US" dirty="0"/>
-              <a:t>New Teams!</a:t>
-            </a:r>
-          </a:p>
-        </p:txBody>
-      </p:sp>
-      <p:sp>
-        <p:nvSpPr>
-          <p:cNvPr id="5" name="Text Placeholder 4">
-            <a:extLst>
-              <a:ext uri="{FF2B5EF4-FFF2-40B4-BE49-F238E27FC236}">
-                <a16:creationId xmlns:a16="http://schemas.microsoft.com/office/drawing/2014/main" id="{7338624E-7F8E-70EF-6AB9-B1E07A9C6278}"/>
-              </a:ext>
-            </a:extLst>
-          </p:cNvPr>
-          <p:cNvSpPr>
-            <a:spLocks noGrp="1"/>
-          </p:cNvSpPr>
-          <p:nvPr>
-            <p:ph type="body" idx="1"/>
-          </p:nvPr>
-        </p:nvSpPr>
-        <p:spPr/>
-        <p:txBody>
-          <a:bodyPr/>
-          <a:lstStyle/>
-          <a:p>
-            <a:r>
-              <a:rPr lang="en-US" dirty="0"/>
-              <a:t>Team 1</a:t>
-            </a:r>
-          </a:p>
-        </p:txBody>
-      </p:sp>
-      <p:sp>
-        <p:nvSpPr>
-          <p:cNvPr id="6" name="Content Placeholder 5">
-            <a:extLst>
-              <a:ext uri="{FF2B5EF4-FFF2-40B4-BE49-F238E27FC236}">
-                <a16:creationId xmlns:a16="http://schemas.microsoft.com/office/drawing/2014/main" id="{D4E17669-F068-5F03-1BA2-21A30D1B816E}"/>
+              <a:t>Friday</a:t>
+            </a:r>
+          </a:p>
+        </p:txBody>
+      </p:sp>
+      <p:sp>
+        <p:nvSpPr>
+          <p:cNvPr id="3" name="Content Placeholder 2">
+            <a:extLst>
+              <a:ext uri="{FF2B5EF4-FFF2-40B4-BE49-F238E27FC236}">
+                <a16:creationId xmlns:a16="http://schemas.microsoft.com/office/drawing/2014/main" id="{46C0070C-7173-4B4F-DD54-DAB13D13D1BA}"/>
+              </a:ext>
+            </a:extLst>
+          </p:cNvPr>
+          <p:cNvSpPr>
+            <a:spLocks noGrp="1"/>
+          </p:cNvSpPr>
+          <p:nvPr>
+            <p:ph sz="half" idx="1"/>
+          </p:nvPr>
+        </p:nvSpPr>
+        <p:spPr/>
+        <p:txBody>
+          <a:bodyPr/>
+          <a:lstStyle/>
+          <a:p>
+            <a:endParaRPr lang="en-US"/>
+          </a:p>
+        </p:txBody>
+      </p:sp>
+      <p:sp>
+        <p:nvSpPr>
+          <p:cNvPr id="4" name="Content Placeholder 3">
+            <a:extLst>
+              <a:ext uri="{FF2B5EF4-FFF2-40B4-BE49-F238E27FC236}">
+                <a16:creationId xmlns:a16="http://schemas.microsoft.com/office/drawing/2014/main" id="{2D6FAC2C-0F5C-B6E7-9AD0-33560F395091}"/>
               </a:ext>
             </a:extLst>
           </p:cNvPr>
@@ -3637,398 +3637,14 @@
           <a:bodyPr/>
           <a:lstStyle/>
           <a:p>
-            <a:r>
-              <a:rPr lang="en-US" dirty="0"/>
-              <a:t>Team OIC:</a:t>
-            </a:r>
-          </a:p>
-          <a:p>
-            <a:r>
-              <a:rPr lang="en-US" dirty="0"/>
-              <a:t>Team NCOIC: </a:t>
-            </a:r>
-          </a:p>
-        </p:txBody>
-      </p:sp>
-      <p:sp>
-        <p:nvSpPr>
-          <p:cNvPr id="7" name="Text Placeholder 6">
-            <a:extLst>
-              <a:ext uri="{FF2B5EF4-FFF2-40B4-BE49-F238E27FC236}">
-                <a16:creationId xmlns:a16="http://schemas.microsoft.com/office/drawing/2014/main" id="{93DE950B-709B-45C7-B1CD-179289595D5F}"/>
-              </a:ext>
-            </a:extLst>
-          </p:cNvPr>
-          <p:cNvSpPr>
-            <a:spLocks noGrp="1"/>
-          </p:cNvSpPr>
-          <p:nvPr>
-            <p:ph type="body" sz="quarter" idx="3"/>
-          </p:nvPr>
-        </p:nvSpPr>
-        <p:spPr/>
-        <p:txBody>
-          <a:bodyPr/>
-          <a:lstStyle/>
-          <a:p>
-            <a:r>
-              <a:rPr lang="en-US" dirty="0"/>
-              <a:t>Team 2</a:t>
-            </a:r>
-          </a:p>
-        </p:txBody>
-      </p:sp>
-      <p:sp>
-        <p:nvSpPr>
-          <p:cNvPr id="8" name="Content Placeholder 7">
-            <a:extLst>
-              <a:ext uri="{FF2B5EF4-FFF2-40B4-BE49-F238E27FC236}">
-                <a16:creationId xmlns:a16="http://schemas.microsoft.com/office/drawing/2014/main" id="{1E18948B-3825-3ACB-1851-A6FE376DCC80}"/>
-              </a:ext>
-            </a:extLst>
-          </p:cNvPr>
-          <p:cNvSpPr>
-            <a:spLocks noGrp="1"/>
-          </p:cNvSpPr>
-          <p:nvPr>
-            <p:ph sz="quarter" idx="4"/>
-          </p:nvPr>
-        </p:nvSpPr>
-        <p:spPr/>
-        <p:txBody>
-          <a:bodyPr/>
-          <a:lstStyle/>
-          <a:p>
-            <a:r>
-              <a:rPr lang="en-US" dirty="0"/>
-              <a:t>Team OIC:</a:t>
-            </a:r>
-          </a:p>
-          <a:p>
-            <a:r>
-              <a:rPr lang="en-US" dirty="0"/>
-              <a:t>Team NCOIC:</a:t>
-            </a:r>
+            <a:endParaRPr lang="en-US"/>
           </a:p>
         </p:txBody>
       </p:sp>
     </p:spTree>
     <p:extLst>
       <p:ext uri="{BB962C8B-B14F-4D97-AF65-F5344CB8AC3E}">
-        <p14:creationId xmlns:p14="http://schemas.microsoft.com/office/powerpoint/2010/main" val="1443364931"/>
-      </p:ext>
-    </p:extLst>
-  </p:cSld>
-  <p:clrMapOvr>
-    <a:masterClrMapping/>
-  </p:clrMapOvr>
-</p:sld>
-</file>
-
-<file path=ppt/slides/slide4.xml><?xml version="1.0" encoding="utf-8"?>
-<p:sld xmlns:a="http://schemas.openxmlformats.org/drawingml/2006/main" xmlns:r="http://schemas.openxmlformats.org/officeDocument/2006/relationships" xmlns:p="http://schemas.openxmlformats.org/presentationml/2006/main">
-  <p:cSld>
-    <p:spTree>
-      <p:nvGrpSpPr>
-        <p:cNvPr id="1" name=""/>
-        <p:cNvGrpSpPr/>
-        <p:nvPr/>
-      </p:nvGrpSpPr>
-      <p:grpSpPr>
-        <a:xfrm>
-          <a:off x="0" y="0"/>
-          <a:ext cx="0" cy="0"/>
-          <a:chOff x="0" y="0"/>
-          <a:chExt cx="0" cy="0"/>
-        </a:xfrm>
-      </p:grpSpPr>
-      <p:sp>
-        <p:nvSpPr>
-          <p:cNvPr id="2" name="Title 1">
-            <a:extLst>
-              <a:ext uri="{FF2B5EF4-FFF2-40B4-BE49-F238E27FC236}">
-                <a16:creationId xmlns:a16="http://schemas.microsoft.com/office/drawing/2014/main" id="{8AEC1418-0A90-D116-86D1-2A8F7317F58D}"/>
-              </a:ext>
-            </a:extLst>
-          </p:cNvPr>
-          <p:cNvSpPr>
-            <a:spLocks noGrp="1"/>
-          </p:cNvSpPr>
-          <p:nvPr>
-            <p:ph type="title"/>
-          </p:nvPr>
-        </p:nvSpPr>
-        <p:spPr/>
-        <p:txBody>
-          <a:bodyPr/>
-          <a:lstStyle/>
-          <a:p>
-            <a:r>
-              <a:rPr lang="en-US" dirty="0"/>
-              <a:t>Volunteering Friday</a:t>
-            </a:r>
-          </a:p>
-        </p:txBody>
-      </p:sp>
-      <p:sp>
-        <p:nvSpPr>
-          <p:cNvPr id="3" name="Text Placeholder 2">
-            <a:extLst>
-              <a:ext uri="{FF2B5EF4-FFF2-40B4-BE49-F238E27FC236}">
-                <a16:creationId xmlns:a16="http://schemas.microsoft.com/office/drawing/2014/main" id="{58BD2784-B53B-5A46-5846-77A8833142A4}"/>
-              </a:ext>
-            </a:extLst>
-          </p:cNvPr>
-          <p:cNvSpPr>
-            <a:spLocks noGrp="1"/>
-          </p:cNvSpPr>
-          <p:nvPr>
-            <p:ph type="body" idx="1"/>
-          </p:nvPr>
-        </p:nvSpPr>
-        <p:spPr/>
-        <p:txBody>
-          <a:bodyPr/>
-          <a:lstStyle/>
-          <a:p>
-            <a:r>
-              <a:rPr lang="en-US" dirty="0"/>
-              <a:t>Place 1</a:t>
-            </a:r>
-          </a:p>
-        </p:txBody>
-      </p:sp>
-      <p:sp>
-        <p:nvSpPr>
-          <p:cNvPr id="4" name="Content Placeholder 3">
-            <a:extLst>
-              <a:ext uri="{FF2B5EF4-FFF2-40B4-BE49-F238E27FC236}">
-                <a16:creationId xmlns:a16="http://schemas.microsoft.com/office/drawing/2014/main" id="{01F6189C-8108-0537-9FB2-7EBFD4D75EAF}"/>
-              </a:ext>
-            </a:extLst>
-          </p:cNvPr>
-          <p:cNvSpPr>
-            <a:spLocks noGrp="1"/>
-          </p:cNvSpPr>
-          <p:nvPr>
-            <p:ph sz="half" idx="2"/>
-          </p:nvPr>
-        </p:nvSpPr>
-        <p:spPr/>
-        <p:txBody>
-          <a:bodyPr/>
-          <a:lstStyle/>
-          <a:p>
-            <a:r>
-              <a:rPr lang="en-US" dirty="0"/>
-              <a:t>Address</a:t>
-            </a:r>
-          </a:p>
-          <a:p>
-            <a:r>
-              <a:rPr lang="en-US" dirty="0"/>
-              <a:t>Time</a:t>
-            </a:r>
-          </a:p>
-          <a:p>
-            <a:r>
-              <a:rPr lang="en-US" dirty="0"/>
-              <a:t>“Uniform”</a:t>
-            </a:r>
-          </a:p>
-          <a:p>
-            <a:r>
-              <a:rPr lang="en-US" dirty="0"/>
-              <a:t>Tasks</a:t>
-            </a:r>
-          </a:p>
-          <a:p>
-            <a:endParaRPr lang="en-US" dirty="0"/>
-          </a:p>
-        </p:txBody>
-      </p:sp>
-      <p:sp>
-        <p:nvSpPr>
-          <p:cNvPr id="5" name="Text Placeholder 4">
-            <a:extLst>
-              <a:ext uri="{FF2B5EF4-FFF2-40B4-BE49-F238E27FC236}">
-                <a16:creationId xmlns:a16="http://schemas.microsoft.com/office/drawing/2014/main" id="{6B2DF274-5984-4F80-1E2B-4152556EE83F}"/>
-              </a:ext>
-            </a:extLst>
-          </p:cNvPr>
-          <p:cNvSpPr>
-            <a:spLocks noGrp="1"/>
-          </p:cNvSpPr>
-          <p:nvPr>
-            <p:ph type="body" sz="quarter" idx="3"/>
-          </p:nvPr>
-        </p:nvSpPr>
-        <p:spPr/>
-        <p:txBody>
-          <a:bodyPr/>
-          <a:lstStyle/>
-          <a:p>
-            <a:r>
-              <a:rPr lang="en-US" dirty="0"/>
-              <a:t>Place 2</a:t>
-            </a:r>
-          </a:p>
-        </p:txBody>
-      </p:sp>
-      <p:sp>
-        <p:nvSpPr>
-          <p:cNvPr id="6" name="Content Placeholder 5">
-            <a:extLst>
-              <a:ext uri="{FF2B5EF4-FFF2-40B4-BE49-F238E27FC236}">
-                <a16:creationId xmlns:a16="http://schemas.microsoft.com/office/drawing/2014/main" id="{9A63B274-928C-7966-B224-7E7D8DB917A2}"/>
-              </a:ext>
-            </a:extLst>
-          </p:cNvPr>
-          <p:cNvSpPr>
-            <a:spLocks noGrp="1"/>
-          </p:cNvSpPr>
-          <p:nvPr>
-            <p:ph sz="quarter" idx="4"/>
-          </p:nvPr>
-        </p:nvSpPr>
-        <p:spPr/>
-        <p:txBody>
-          <a:bodyPr/>
-          <a:lstStyle/>
-          <a:p>
-            <a:r>
-              <a:rPr lang="en-US" dirty="0"/>
-              <a:t>Address</a:t>
-            </a:r>
-          </a:p>
-          <a:p>
-            <a:r>
-              <a:rPr lang="en-US" dirty="0"/>
-              <a:t>Time</a:t>
-            </a:r>
-          </a:p>
-          <a:p>
-            <a:r>
-              <a:rPr lang="en-US" dirty="0"/>
-              <a:t>“Uniform”</a:t>
-            </a:r>
-          </a:p>
-          <a:p>
-            <a:r>
-              <a:rPr lang="en-US" dirty="0"/>
-              <a:t>Tasks</a:t>
-            </a:r>
-          </a:p>
-        </p:txBody>
-      </p:sp>
-    </p:spTree>
-    <p:extLst>
-      <p:ext uri="{BB962C8B-B14F-4D97-AF65-F5344CB8AC3E}">
-        <p14:creationId xmlns:p14="http://schemas.microsoft.com/office/powerpoint/2010/main" val="1396215634"/>
-      </p:ext>
-    </p:extLst>
-  </p:cSld>
-  <p:clrMapOvr>
-    <a:masterClrMapping/>
-  </p:clrMapOvr>
-</p:sld>
-</file>
-
-<file path=ppt/slides/slide5.xml><?xml version="1.0" encoding="utf-8"?>
-<p:sld xmlns:a="http://schemas.openxmlformats.org/drawingml/2006/main" xmlns:r="http://schemas.openxmlformats.org/officeDocument/2006/relationships" xmlns:p="http://schemas.openxmlformats.org/presentationml/2006/main">
-  <p:cSld>
-    <p:spTree>
-      <p:nvGrpSpPr>
-        <p:cNvPr id="1" name=""/>
-        <p:cNvGrpSpPr/>
-        <p:nvPr/>
-      </p:nvGrpSpPr>
-      <p:grpSpPr>
-        <a:xfrm>
-          <a:off x="0" y="0"/>
-          <a:ext cx="0" cy="0"/>
-          <a:chOff x="0" y="0"/>
-          <a:chExt cx="0" cy="0"/>
-        </a:xfrm>
-      </p:grpSpPr>
-      <p:sp>
-        <p:nvSpPr>
-          <p:cNvPr id="2" name="Title 1">
-            <a:extLst>
-              <a:ext uri="{FF2B5EF4-FFF2-40B4-BE49-F238E27FC236}">
-                <a16:creationId xmlns:a16="http://schemas.microsoft.com/office/drawing/2014/main" id="{E99D2EA5-C8F4-A99A-8A4D-B24C138BA67C}"/>
-              </a:ext>
-            </a:extLst>
-          </p:cNvPr>
-          <p:cNvSpPr>
-            <a:spLocks noGrp="1"/>
-          </p:cNvSpPr>
-          <p:nvPr>
-            <p:ph type="title"/>
-          </p:nvPr>
-        </p:nvSpPr>
-        <p:spPr/>
-        <p:txBody>
-          <a:bodyPr/>
-          <a:lstStyle/>
-          <a:p>
-            <a:r>
-              <a:rPr lang="en-US" dirty="0"/>
-              <a:t>Others</a:t>
-            </a:r>
-          </a:p>
-        </p:txBody>
-      </p:sp>
-      <p:sp>
-        <p:nvSpPr>
-          <p:cNvPr id="7" name="Content Placeholder 6">
-            <a:extLst>
-              <a:ext uri="{FF2B5EF4-FFF2-40B4-BE49-F238E27FC236}">
-                <a16:creationId xmlns:a16="http://schemas.microsoft.com/office/drawing/2014/main" id="{152F27DC-B25F-7B54-9DA6-C52777738890}"/>
-              </a:ext>
-            </a:extLst>
-          </p:cNvPr>
-          <p:cNvSpPr>
-            <a:spLocks noGrp="1"/>
-          </p:cNvSpPr>
-          <p:nvPr>
-            <p:ph idx="1"/>
-          </p:nvPr>
-        </p:nvSpPr>
-        <p:spPr/>
-        <p:txBody>
-          <a:bodyPr/>
-          <a:lstStyle/>
-          <a:p>
-            <a:r>
-              <a:rPr lang="en-US" dirty="0"/>
-              <a:t>Course/lesson refinement</a:t>
-            </a:r>
-          </a:p>
-          <a:p>
-            <a:r>
-              <a:rPr lang="en-US" dirty="0"/>
-              <a:t>Kata development</a:t>
-            </a:r>
-          </a:p>
-          <a:p>
-            <a:r>
-              <a:rPr lang="en-US" dirty="0"/>
-              <a:t>Friday recitation development</a:t>
-            </a:r>
-          </a:p>
-          <a:p>
-            <a:r>
-              <a:rPr lang="en-US" dirty="0"/>
-              <a:t>Help move to new space</a:t>
-            </a:r>
-          </a:p>
-        </p:txBody>
-      </p:sp>
-    </p:spTree>
-    <p:extLst>
-      <p:ext uri="{BB962C8B-B14F-4D97-AF65-F5344CB8AC3E}">
-        <p14:creationId xmlns:p14="http://schemas.microsoft.com/office/powerpoint/2010/main" val="1319749919"/>
+        <p14:creationId xmlns:p14="http://schemas.microsoft.com/office/powerpoint/2010/main" val="1576522222"/>
       </p:ext>
     </p:extLst>
   </p:cSld>

</xml_diff>